<commit_message>
add slides + pdf
</commit_message>
<xml_diff>
--- a/doc/slides.pptx
+++ b/doc/slides.pptx
@@ -8444,6 +8444,13 @@
   <p:clrMapOvr>
     <a:masterClrMapping/>
   </p:clrMapOvr>
+  <p:timing>
+    <p:tnLst>
+      <p:par>
+        <p:cTn id="1" dur="indefinite" restart="never" nodeType="tmRoot"/>
+      </p:par>
+    </p:tnLst>
+  </p:timing>
 </p:sld>
 </file>
 
@@ -11627,6 +11634,13 @@
   <p:clrMapOvr>
     <a:masterClrMapping/>
   </p:clrMapOvr>
+  <p:timing>
+    <p:tnLst>
+      <p:par>
+        <p:cTn id="1" dur="indefinite" restart="never" nodeType="tmRoot"/>
+      </p:par>
+    </p:tnLst>
+  </p:timing>
 </p:sld>
 </file>
 
@@ -12262,6 +12276,13 @@
   <p:clrMapOvr>
     <a:masterClrMapping/>
   </p:clrMapOvr>
+  <p:timing>
+    <p:tnLst>
+      <p:par>
+        <p:cTn id="1" dur="indefinite" restart="never" nodeType="tmRoot"/>
+      </p:par>
+    </p:tnLst>
+  </p:timing>
 </p:sld>
 </file>
 
@@ -12336,6 +12357,462 @@
           </a:prstGeom>
         </p:spPr>
       </p:pic>
+      <p:sp>
+        <p:nvSpPr>
+          <p:cNvPr id="7" name="ZoneTexte 6"/>
+          <p:cNvSpPr txBox="1"/>
+          <p:nvPr/>
+        </p:nvSpPr>
+        <p:spPr>
+          <a:xfrm>
+            <a:off x="6375633" y="217818"/>
+            <a:ext cx="5642891" cy="1477328"/>
+          </a:xfrm>
+          <a:prstGeom prst="rect">
+            <a:avLst/>
+          </a:prstGeom>
+          <a:noFill/>
+        </p:spPr>
+        <p:txBody>
+          <a:bodyPr wrap="none" rtlCol="0">
+            <a:spAutoFit/>
+          </a:bodyPr>
+          <a:lstStyle/>
+          <a:p>
+            <a:r>
+              <a:rPr lang="fr-FR" dirty="0" err="1" smtClean="0">
+                <a:solidFill>
+                  <a:srgbClr val="FF0000"/>
+                </a:solidFill>
+              </a:rPr>
+              <a:t>Sextractor</a:t>
+            </a:r>
+            <a:r>
+              <a:rPr lang="fr-FR" dirty="0" smtClean="0">
+                <a:solidFill>
+                  <a:srgbClr val="FF0000"/>
+                </a:solidFill>
+              </a:rPr>
+              <a:t> plain </a:t>
+            </a:r>
+            <a:r>
+              <a:rPr lang="fr-FR" dirty="0" err="1" smtClean="0">
+                <a:solidFill>
+                  <a:srgbClr val="FF0000"/>
+                </a:solidFill>
+              </a:rPr>
+              <a:t>bash</a:t>
+            </a:r>
+            <a:r>
+              <a:rPr lang="fr-FR" dirty="0" smtClean="0">
+                <a:solidFill>
+                  <a:srgbClr val="FF0000"/>
+                </a:solidFill>
+              </a:rPr>
+              <a:t> </a:t>
+            </a:r>
+            <a:r>
+              <a:rPr lang="fr-FR" dirty="0" err="1" smtClean="0">
+                <a:solidFill>
+                  <a:srgbClr val="FF0000"/>
+                </a:solidFill>
+              </a:rPr>
+              <a:t>without</a:t>
+            </a:r>
+            <a:r>
+              <a:rPr lang="fr-FR" dirty="0" smtClean="0">
+                <a:solidFill>
+                  <a:srgbClr val="FF0000"/>
+                </a:solidFill>
+              </a:rPr>
+              <a:t> </a:t>
+            </a:r>
+            <a:r>
+              <a:rPr lang="fr-FR" dirty="0" err="1" smtClean="0">
+                <a:solidFill>
+                  <a:srgbClr val="FF0000"/>
+                </a:solidFill>
+              </a:rPr>
+              <a:t>Spark</a:t>
+            </a:r>
+            <a:endParaRPr lang="fr-FR" dirty="0" smtClean="0">
+              <a:solidFill>
+                <a:srgbClr val="FF0000"/>
+              </a:solidFill>
+            </a:endParaRPr>
+          </a:p>
+          <a:p>
+            <a:r>
+              <a:rPr lang="fr-FR" dirty="0" err="1" smtClean="0">
+                <a:solidFill>
+                  <a:srgbClr val="92D050"/>
+                </a:solidFill>
+              </a:rPr>
+              <a:t>Spark</a:t>
+            </a:r>
+            <a:r>
+              <a:rPr lang="fr-FR" dirty="0" smtClean="0">
+                <a:solidFill>
+                  <a:srgbClr val="92D050"/>
+                </a:solidFill>
+              </a:rPr>
+              <a:t> </a:t>
+            </a:r>
+            <a:r>
+              <a:rPr lang="fr-FR" dirty="0" err="1" smtClean="0">
+                <a:solidFill>
+                  <a:srgbClr val="92D050"/>
+                </a:solidFill>
+              </a:rPr>
+              <a:t>with</a:t>
+            </a:r>
+            <a:r>
+              <a:rPr lang="fr-FR" dirty="0" smtClean="0">
+                <a:solidFill>
+                  <a:srgbClr val="92D050"/>
+                </a:solidFill>
+              </a:rPr>
+              <a:t> 10 partitions</a:t>
+            </a:r>
+          </a:p>
+          <a:p>
+            <a:r>
+              <a:rPr lang="fr-FR" dirty="0" err="1" smtClean="0">
+                <a:solidFill>
+                  <a:schemeClr val="bg1">
+                    <a:lumMod val="65000"/>
+                  </a:schemeClr>
+                </a:solidFill>
+              </a:rPr>
+              <a:t>Spark</a:t>
+            </a:r>
+            <a:r>
+              <a:rPr lang="fr-FR" dirty="0" smtClean="0">
+                <a:solidFill>
+                  <a:schemeClr val="bg1">
+                    <a:lumMod val="65000"/>
+                  </a:schemeClr>
+                </a:solidFill>
+              </a:rPr>
+              <a:t> </a:t>
+            </a:r>
+            <a:r>
+              <a:rPr lang="fr-FR" dirty="0" err="1" smtClean="0">
+                <a:solidFill>
+                  <a:schemeClr val="bg1">
+                    <a:lumMod val="65000"/>
+                  </a:schemeClr>
+                </a:solidFill>
+              </a:rPr>
+              <a:t>with</a:t>
+            </a:r>
+            <a:r>
+              <a:rPr lang="fr-FR" dirty="0" smtClean="0">
+                <a:solidFill>
+                  <a:schemeClr val="bg1">
+                    <a:lumMod val="65000"/>
+                  </a:schemeClr>
+                </a:solidFill>
+              </a:rPr>
+              <a:t> </a:t>
+            </a:r>
+            <a:r>
+              <a:rPr lang="fr-FR" dirty="0" err="1" smtClean="0">
+                <a:solidFill>
+                  <a:schemeClr val="bg1">
+                    <a:lumMod val="65000"/>
+                  </a:schemeClr>
+                </a:solidFill>
+              </a:rPr>
+              <a:t>increasing</a:t>
+            </a:r>
+            <a:r>
+              <a:rPr lang="fr-FR" dirty="0" smtClean="0">
+                <a:solidFill>
+                  <a:schemeClr val="bg1">
+                    <a:lumMod val="65000"/>
+                  </a:schemeClr>
+                </a:solidFill>
+              </a:rPr>
+              <a:t> partitions</a:t>
+            </a:r>
+          </a:p>
+          <a:p>
+            <a:r>
+              <a:rPr lang="fr-FR" dirty="0" err="1" smtClean="0">
+                <a:solidFill>
+                  <a:srgbClr val="FFC000"/>
+                </a:solidFill>
+              </a:rPr>
+              <a:t>Aggregate</a:t>
+            </a:r>
+            <a:r>
+              <a:rPr lang="fr-FR" dirty="0" smtClean="0">
+                <a:solidFill>
+                  <a:srgbClr val="FFC000"/>
+                </a:solidFill>
+              </a:rPr>
+              <a:t> FITS header + all </a:t>
+            </a:r>
+            <a:r>
+              <a:rPr lang="fr-FR" dirty="0" err="1" smtClean="0">
+                <a:solidFill>
+                  <a:srgbClr val="FFC000"/>
+                </a:solidFill>
+              </a:rPr>
+              <a:t>catalogs</a:t>
+            </a:r>
+            <a:r>
+              <a:rPr lang="fr-FR" dirty="0" smtClean="0">
+                <a:solidFill>
+                  <a:srgbClr val="FFC000"/>
+                </a:solidFill>
+              </a:rPr>
+              <a:t> N partitions</a:t>
+            </a:r>
+          </a:p>
+          <a:p>
+            <a:endParaRPr lang="fr-FR" dirty="0"/>
+          </a:p>
+        </p:txBody>
+      </p:sp>
+      <p:sp>
+        <p:nvSpPr>
+          <p:cNvPr id="8" name="ZoneTexte 7"/>
+          <p:cNvSpPr txBox="1"/>
+          <p:nvPr/>
+        </p:nvSpPr>
+        <p:spPr>
+          <a:xfrm>
+            <a:off x="2147582" y="3238356"/>
+            <a:ext cx="3137397" cy="1477328"/>
+          </a:xfrm>
+          <a:prstGeom prst="rect">
+            <a:avLst/>
+          </a:prstGeom>
+          <a:noFill/>
+        </p:spPr>
+        <p:txBody>
+          <a:bodyPr wrap="none" rtlCol="0">
+            <a:spAutoFit/>
+          </a:bodyPr>
+          <a:lstStyle/>
+          <a:p>
+            <a:pPr algn="ctr"/>
+            <a:r>
+              <a:rPr lang="fr-FR" b="1" dirty="0" err="1" smtClean="0"/>
+              <a:t>SparkUI</a:t>
+            </a:r>
+            <a:r>
+              <a:rPr lang="fr-FR" dirty="0" smtClean="0"/>
+              <a:t>:</a:t>
+            </a:r>
+          </a:p>
+          <a:p>
+            <a:r>
+              <a:rPr lang="fr-FR" dirty="0" err="1" smtClean="0"/>
+              <a:t>Homogeneous</a:t>
+            </a:r>
+            <a:r>
+              <a:rPr lang="fr-FR" dirty="0" smtClean="0"/>
+              <a:t> </a:t>
+            </a:r>
+            <a:r>
+              <a:rPr lang="fr-FR" dirty="0" err="1" smtClean="0"/>
+              <a:t>repartitions</a:t>
+            </a:r>
+            <a:endParaRPr lang="fr-FR" dirty="0" smtClean="0"/>
+          </a:p>
+          <a:p>
+            <a:r>
+              <a:rPr lang="fr-FR" dirty="0" smtClean="0"/>
+              <a:t>Of </a:t>
+            </a:r>
+            <a:r>
+              <a:rPr lang="fr-FR" dirty="0" err="1" smtClean="0"/>
+              <a:t>resource</a:t>
+            </a:r>
+            <a:r>
+              <a:rPr lang="fr-FR" dirty="0" smtClean="0"/>
+              <a:t> usage</a:t>
+            </a:r>
+          </a:p>
+          <a:p>
+            <a:r>
+              <a:rPr lang="fr-FR" dirty="0" smtClean="0"/>
+              <a:t>(9 </a:t>
+            </a:r>
+            <a:r>
+              <a:rPr lang="fr-FR" dirty="0" err="1" smtClean="0"/>
+              <a:t>workers</a:t>
+            </a:r>
+            <a:r>
+              <a:rPr lang="fr-FR" dirty="0" smtClean="0"/>
+              <a:t>, 100 files)</a:t>
+            </a:r>
+          </a:p>
+          <a:p>
+            <a:endParaRPr lang="fr-FR" dirty="0"/>
+          </a:p>
+        </p:txBody>
+      </p:sp>
+      <p:sp>
+        <p:nvSpPr>
+          <p:cNvPr id="9" name="ZoneTexte 8"/>
+          <p:cNvSpPr txBox="1"/>
+          <p:nvPr/>
+        </p:nvSpPr>
+        <p:spPr>
+          <a:xfrm>
+            <a:off x="721451" y="4999838"/>
+            <a:ext cx="5091424" cy="1477328"/>
+          </a:xfrm>
+          <a:prstGeom prst="rect">
+            <a:avLst/>
+          </a:prstGeom>
+          <a:solidFill>
+            <a:schemeClr val="bg1"/>
+          </a:solidFill>
+          <a:ln>
+            <a:solidFill>
+              <a:srgbClr val="FF0000"/>
+            </a:solidFill>
+          </a:ln>
+        </p:spPr>
+        <p:txBody>
+          <a:bodyPr wrap="square" rtlCol="0">
+            <a:spAutoFit/>
+          </a:bodyPr>
+          <a:lstStyle/>
+          <a:p>
+            <a:pPr algn="ctr"/>
+            <a:r>
+              <a:rPr lang="fr-FR" dirty="0" smtClean="0"/>
+              <a:t>Time for 9 </a:t>
+            </a:r>
+            <a:r>
+              <a:rPr lang="fr-FR" dirty="0" err="1" smtClean="0"/>
+              <a:t>workers</a:t>
+            </a:r>
+            <a:r>
+              <a:rPr lang="fr-FR" dirty="0" smtClean="0"/>
+              <a:t> </a:t>
+            </a:r>
+            <a:r>
+              <a:rPr lang="fr-FR" dirty="0" err="1" smtClean="0"/>
+              <a:t>is</a:t>
+            </a:r>
+            <a:r>
+              <a:rPr lang="fr-FR" dirty="0"/>
+              <a:t> </a:t>
+            </a:r>
+            <a:r>
+              <a:rPr lang="fr-FR" dirty="0" smtClean="0"/>
+              <a:t>~1/10 the </a:t>
+            </a:r>
+          </a:p>
+          <a:p>
+            <a:pPr algn="ctr"/>
+            <a:r>
+              <a:rPr lang="fr-FR" dirty="0" smtClean="0"/>
+              <a:t>time for </a:t>
+            </a:r>
+            <a:r>
+              <a:rPr lang="fr-FR" dirty="0" err="1" smtClean="0"/>
+              <a:t>raw</a:t>
+            </a:r>
+            <a:r>
+              <a:rPr lang="fr-FR" dirty="0" smtClean="0"/>
+              <a:t> </a:t>
+            </a:r>
+            <a:r>
+              <a:rPr lang="fr-FR" dirty="0" err="1" smtClean="0"/>
+              <a:t>execution</a:t>
+            </a:r>
+            <a:r>
+              <a:rPr lang="fr-FR" dirty="0" smtClean="0"/>
+              <a:t> </a:t>
+            </a:r>
+            <a:r>
+              <a:rPr lang="fr-FR" dirty="0" err="1" smtClean="0"/>
+              <a:t>without</a:t>
+            </a:r>
+            <a:r>
+              <a:rPr lang="fr-FR" dirty="0" smtClean="0"/>
+              <a:t> </a:t>
+            </a:r>
+            <a:r>
+              <a:rPr lang="fr-FR" dirty="0" err="1" smtClean="0"/>
+              <a:t>Spark</a:t>
+            </a:r>
+            <a:r>
+              <a:rPr lang="fr-FR" dirty="0" smtClean="0"/>
+              <a:t>:</a:t>
+            </a:r>
+          </a:p>
+          <a:p>
+            <a:endParaRPr lang="fr-FR" i="1" dirty="0" smtClean="0"/>
+          </a:p>
+          <a:p>
+            <a:pPr algn="ctr"/>
+            <a:r>
+              <a:rPr lang="fr-FR" i="1" dirty="0" err="1" smtClean="0"/>
+              <a:t>sextractor</a:t>
+            </a:r>
+            <a:r>
+              <a:rPr lang="fr-FR" i="1" dirty="0" smtClean="0"/>
+              <a:t> </a:t>
+            </a:r>
+            <a:r>
+              <a:rPr lang="fr-FR" i="1" dirty="0" err="1" smtClean="0"/>
+              <a:t>runs</a:t>
+            </a:r>
+            <a:r>
+              <a:rPr lang="fr-FR" i="1" dirty="0" smtClean="0"/>
+              <a:t> </a:t>
+            </a:r>
+            <a:r>
+              <a:rPr lang="fr-FR" i="1" dirty="0" err="1" smtClean="0"/>
+              <a:t>with</a:t>
+            </a:r>
+            <a:r>
+              <a:rPr lang="fr-FR" i="1" dirty="0" smtClean="0"/>
+              <a:t> </a:t>
+            </a:r>
+            <a:r>
+              <a:rPr lang="fr-FR" i="1" dirty="0" err="1" smtClean="0"/>
+              <a:t>same</a:t>
+            </a:r>
+            <a:r>
+              <a:rPr lang="fr-FR" i="1" dirty="0" smtClean="0"/>
+              <a:t> </a:t>
+            </a:r>
+            <a:r>
+              <a:rPr lang="fr-FR" i="1" dirty="0" err="1" smtClean="0"/>
+              <a:t>execution</a:t>
+            </a:r>
+            <a:r>
+              <a:rPr lang="fr-FR" i="1" dirty="0" smtClean="0"/>
+              <a:t> mode</a:t>
+            </a:r>
+          </a:p>
+          <a:p>
+            <a:pPr algn="ctr"/>
+            <a:r>
+              <a:rPr lang="fr-FR" i="1" dirty="0" smtClean="0"/>
+              <a:t>In </a:t>
+            </a:r>
+            <a:r>
+              <a:rPr lang="fr-FR" i="1" dirty="0" err="1" smtClean="0"/>
+              <a:t>both</a:t>
+            </a:r>
+            <a:r>
+              <a:rPr lang="fr-FR" i="1" dirty="0" smtClean="0"/>
+              <a:t> cases (multithreading)</a:t>
+            </a:r>
+          </a:p>
+        </p:txBody>
+      </p:sp>
     </p:spTree>
     <p:extLst>
       <p:ext uri="{BB962C8B-B14F-4D97-AF65-F5344CB8AC3E}">
@@ -12346,6 +12823,13 @@
   <p:clrMapOvr>
     <a:masterClrMapping/>
   </p:clrMapOvr>
+  <p:timing>
+    <p:tnLst>
+      <p:par>
+        <p:cTn id="1" dur="indefinite" restart="never" nodeType="tmRoot"/>
+      </p:par>
+    </p:tnLst>
+  </p:timing>
 </p:sld>
 </file>
 

</xml_diff>